<commit_message>
modeling: update question on OODM
</commit_message>
<xml_diff>
--- a/diagrams/modelling/modellingStructures/objectOrientedDomainModels/courseDomainModel.pptx
+++ b/diagrams/modelling/modellingStructures/objectOrientedDomainModels/courseDomainModel.pptx
@@ -6,6 +6,7 @@
   </p:sldMasterIdLst>
   <p:sldIdLst>
     <p:sldId id="256" r:id="rId2"/>
+    <p:sldId id="257" r:id="rId3"/>
   </p:sldIdLst>
   <p:sldSz cx="9144000" cy="6858000" type="screen4x3"/>
   <p:notesSz cx="6858000" cy="9144000"/>
@@ -304,7 +305,7 @@
           <a:p>
             <a:fld id="{ED88E258-B0CF-4D00-9DD0-47F6C19C998A}" type="datetimeFigureOut">
               <a:rPr lang="en-SG" smtClean="0"/>
-              <a:t>22/10/2018</a:t>
+              <a:t>13/10/2019</a:t>
             </a:fld>
             <a:endParaRPr lang="en-SG"/>
           </a:p>
@@ -474,7 +475,7 @@
           <a:p>
             <a:fld id="{ED88E258-B0CF-4D00-9DD0-47F6C19C998A}" type="datetimeFigureOut">
               <a:rPr lang="en-SG" smtClean="0"/>
-              <a:t>22/10/2018</a:t>
+              <a:t>13/10/2019</a:t>
             </a:fld>
             <a:endParaRPr lang="en-SG"/>
           </a:p>
@@ -654,7 +655,7 @@
           <a:p>
             <a:fld id="{ED88E258-B0CF-4D00-9DD0-47F6C19C998A}" type="datetimeFigureOut">
               <a:rPr lang="en-SG" smtClean="0"/>
-              <a:t>22/10/2018</a:t>
+              <a:t>13/10/2019</a:t>
             </a:fld>
             <a:endParaRPr lang="en-SG"/>
           </a:p>
@@ -824,7 +825,7 @@
           <a:p>
             <a:fld id="{ED88E258-B0CF-4D00-9DD0-47F6C19C998A}" type="datetimeFigureOut">
               <a:rPr lang="en-SG" smtClean="0"/>
-              <a:t>22/10/2018</a:t>
+              <a:t>13/10/2019</a:t>
             </a:fld>
             <a:endParaRPr lang="en-SG"/>
           </a:p>
@@ -1070,7 +1071,7 @@
           <a:p>
             <a:fld id="{ED88E258-B0CF-4D00-9DD0-47F6C19C998A}" type="datetimeFigureOut">
               <a:rPr lang="en-SG" smtClean="0"/>
-              <a:t>22/10/2018</a:t>
+              <a:t>13/10/2019</a:t>
             </a:fld>
             <a:endParaRPr lang="en-SG"/>
           </a:p>
@@ -1358,7 +1359,7 @@
           <a:p>
             <a:fld id="{ED88E258-B0CF-4D00-9DD0-47F6C19C998A}" type="datetimeFigureOut">
               <a:rPr lang="en-SG" smtClean="0"/>
-              <a:t>22/10/2018</a:t>
+              <a:t>13/10/2019</a:t>
             </a:fld>
             <a:endParaRPr lang="en-SG"/>
           </a:p>
@@ -1780,7 +1781,7 @@
           <a:p>
             <a:fld id="{ED88E258-B0CF-4D00-9DD0-47F6C19C998A}" type="datetimeFigureOut">
               <a:rPr lang="en-SG" smtClean="0"/>
-              <a:t>22/10/2018</a:t>
+              <a:t>13/10/2019</a:t>
             </a:fld>
             <a:endParaRPr lang="en-SG"/>
           </a:p>
@@ -1898,7 +1899,7 @@
           <a:p>
             <a:fld id="{ED88E258-B0CF-4D00-9DD0-47F6C19C998A}" type="datetimeFigureOut">
               <a:rPr lang="en-SG" smtClean="0"/>
-              <a:t>22/10/2018</a:t>
+              <a:t>13/10/2019</a:t>
             </a:fld>
             <a:endParaRPr lang="en-SG"/>
           </a:p>
@@ -1993,7 +1994,7 @@
           <a:p>
             <a:fld id="{ED88E258-B0CF-4D00-9DD0-47F6C19C998A}" type="datetimeFigureOut">
               <a:rPr lang="en-SG" smtClean="0"/>
-              <a:t>22/10/2018</a:t>
+              <a:t>13/10/2019</a:t>
             </a:fld>
             <a:endParaRPr lang="en-SG"/>
           </a:p>
@@ -2270,7 +2271,7 @@
           <a:p>
             <a:fld id="{ED88E258-B0CF-4D00-9DD0-47F6C19C998A}" type="datetimeFigureOut">
               <a:rPr lang="en-SG" smtClean="0"/>
-              <a:t>22/10/2018</a:t>
+              <a:t>13/10/2019</a:t>
             </a:fld>
             <a:endParaRPr lang="en-SG"/>
           </a:p>
@@ -2523,7 +2524,7 @@
           <a:p>
             <a:fld id="{ED88E258-B0CF-4D00-9DD0-47F6C19C998A}" type="datetimeFigureOut">
               <a:rPr lang="en-SG" smtClean="0"/>
-              <a:t>22/10/2018</a:t>
+              <a:t>13/10/2019</a:t>
             </a:fld>
             <a:endParaRPr lang="en-SG"/>
           </a:p>
@@ -2736,7 +2737,7 @@
           <a:p>
             <a:fld id="{ED88E258-B0CF-4D00-9DD0-47F6C19C998A}" type="datetimeFigureOut">
               <a:rPr lang="en-SG" smtClean="0"/>
-              <a:t>22/10/2018</a:t>
+              <a:t>13/10/2019</a:t>
             </a:fld>
             <a:endParaRPr lang="en-SG"/>
           </a:p>
@@ -3201,8 +3202,8 @@
         </p:nvSpPr>
         <p:spPr>
           <a:xfrm>
-            <a:off x="3838308" y="1219200"/>
-            <a:ext cx="785228" cy="304800"/>
+            <a:off x="2804556" y="1219200"/>
+            <a:ext cx="1082548" cy="304800"/>
           </a:xfrm>
           <a:prstGeom prst="rect">
             <a:avLst/>
@@ -3314,7 +3315,7 @@
         </p:nvSpPr>
         <p:spPr>
           <a:xfrm>
-            <a:off x="3538570" y="1089262"/>
+            <a:off x="2483768" y="1408377"/>
             <a:ext cx="257728" cy="369332"/>
           </a:xfrm>
           <a:prstGeom prst="rect">
@@ -3463,8 +3464,8 @@
         </p:nvSpPr>
         <p:spPr>
           <a:xfrm>
-            <a:off x="2329856" y="3581400"/>
-            <a:ext cx="1570456" cy="304800"/>
+            <a:off x="2641552" y="3581400"/>
+            <a:ext cx="1234032" cy="304800"/>
           </a:xfrm>
           <a:prstGeom prst="rect">
             <a:avLst/>
@@ -3545,8 +3546,8 @@
         </p:nvSpPr>
         <p:spPr>
           <a:xfrm>
-            <a:off x="4511290" y="2422300"/>
-            <a:ext cx="1356728" cy="304800"/>
+            <a:off x="3985613" y="2178947"/>
+            <a:ext cx="1008416" cy="304800"/>
           </a:xfrm>
           <a:prstGeom prst="rect">
             <a:avLst/>
@@ -3630,8 +3631,8 @@
         </p:nvCxnSpPr>
         <p:spPr>
           <a:xfrm rot="5400000" flipH="1" flipV="1">
-            <a:off x="1757656" y="644450"/>
-            <a:ext cx="1353501" cy="2807803"/>
+            <a:off x="1240780" y="1161326"/>
+            <a:ext cx="1353501" cy="1774051"/>
           </a:xfrm>
           <a:prstGeom prst="bentConnector2">
             <a:avLst/>
@@ -3651,19 +3652,17 @@
           <p:cNvPr id="66" name="Elbow Connector 65"/>
           <p:cNvCxnSpPr>
             <a:stCxn id="79" idx="1"/>
-            <a:endCxn id="64" idx="3"/>
+            <a:endCxn id="64" idx="0"/>
           </p:cNvCxnSpPr>
           <p:nvPr/>
         </p:nvCxnSpPr>
         <p:spPr>
           <a:xfrm rot="10800000" flipV="1">
-            <a:off x="5868018" y="2269900"/>
-            <a:ext cx="685800" cy="304800"/>
-          </a:xfrm>
-          <a:prstGeom prst="bentConnector3">
-            <a:avLst>
-              <a:gd name="adj1" fmla="val 31877"/>
-            </a:avLst>
+            <a:off x="4489821" y="2026547"/>
+            <a:ext cx="730104" cy="152400"/>
+          </a:xfrm>
+          <a:prstGeom prst="bentConnector2">
+            <a:avLst/>
           </a:prstGeom>
           <a:solidFill>
             <a:srgbClr val="F79646"/>
@@ -3687,7 +3686,7 @@
         </p:nvSpPr>
         <p:spPr>
           <a:xfrm>
-            <a:off x="6080088" y="2983468"/>
+            <a:off x="4746195" y="2740115"/>
             <a:ext cx="668354" cy="369332"/>
           </a:xfrm>
           <a:prstGeom prst="rect">
@@ -3761,37 +3760,6 @@
           </a:p>
         </p:txBody>
       </p:sp>
-      <p:cxnSp>
-        <p:nvCxnSpPr>
-          <p:cNvPr id="68" name="Elbow Connector 67"/>
-          <p:cNvCxnSpPr>
-            <a:stCxn id="59" idx="2"/>
-            <a:endCxn id="62" idx="3"/>
-          </p:cNvCxnSpPr>
-          <p:nvPr/>
-        </p:nvCxnSpPr>
-        <p:spPr>
-          <a:xfrm rot="5400000">
-            <a:off x="3379454" y="2031650"/>
-            <a:ext cx="1359119" cy="343818"/>
-          </a:xfrm>
-          <a:prstGeom prst="bentConnector2">
-            <a:avLst/>
-          </a:prstGeom>
-          <a:solidFill>
-            <a:srgbClr val="9BBB59"/>
-          </a:solidFill>
-          <a:ln w="25400" cap="flat" cmpd="sng" algn="ctr">
-            <a:solidFill>
-              <a:srgbClr val="F79646">
-                <a:lumMod val="50000"/>
-              </a:srgbClr>
-            </a:solidFill>
-            <a:prstDash val="solid"/>
-          </a:ln>
-          <a:effectLst/>
-        </p:spPr>
-      </p:cxnSp>
       <p:sp>
         <p:nvSpPr>
           <p:cNvPr id="69" name="Rectangle 68"/>
@@ -3904,8 +3872,8 @@
         </p:nvSpPr>
         <p:spPr>
           <a:xfrm>
-            <a:off x="2049838" y="3399187"/>
-            <a:ext cx="334177" cy="369332"/>
+            <a:off x="2787840" y="3821568"/>
+            <a:ext cx="536164" cy="369332"/>
           </a:xfrm>
           <a:prstGeom prst="rect">
             <a:avLst/>
@@ -3960,7 +3928,7 @@
                 <a:uLnTx/>
                 <a:uFillTx/>
               </a:rPr>
-              <a:t>1</a:t>
+              <a:t>1..*</a:t>
             </a:r>
             <a:endParaRPr kumimoji="0" lang="en-SG" sz="1800" b="0" i="0" u="none" strike="noStrike" kern="0" cap="none" spc="0" normalizeH="0" baseline="0" noProof="0" dirty="0">
               <a:ln>
@@ -3986,7 +3954,7 @@
         </p:nvSpPr>
         <p:spPr>
           <a:xfrm>
-            <a:off x="5395440" y="669031"/>
+            <a:off x="4672657" y="669031"/>
             <a:ext cx="1843559" cy="304800"/>
           </a:xfrm>
           <a:prstGeom prst="rect">
@@ -4068,7 +4036,7 @@
         </p:nvSpPr>
         <p:spPr>
           <a:xfrm rot="16200000">
-            <a:off x="4631002" y="1264988"/>
+            <a:off x="3908219" y="1264988"/>
             <a:ext cx="228600" cy="228600"/>
           </a:xfrm>
           <a:prstGeom prst="triangle">
@@ -4136,7 +4104,7 @@
         </p:nvCxnSpPr>
         <p:spPr>
           <a:xfrm>
-            <a:off x="4859602" y="1379288"/>
+            <a:off x="4136819" y="1379288"/>
             <a:ext cx="535839" cy="220912"/>
           </a:xfrm>
           <a:prstGeom prst="bentConnector3">
@@ -4166,8 +4134,8 @@
         </p:nvSpPr>
         <p:spPr>
           <a:xfrm>
-            <a:off x="5395441" y="1447800"/>
-            <a:ext cx="1570456" cy="304800"/>
+            <a:off x="4672658" y="1447800"/>
+            <a:ext cx="1843558" cy="304800"/>
           </a:xfrm>
           <a:prstGeom prst="rect">
             <a:avLst/>
@@ -4251,7 +4219,7 @@
         </p:nvCxnSpPr>
         <p:spPr>
           <a:xfrm flipV="1">
-            <a:off x="4859602" y="821431"/>
+            <a:off x="4136819" y="821431"/>
             <a:ext cx="535838" cy="557857"/>
           </a:xfrm>
           <a:prstGeom prst="bentConnector3">
@@ -4278,17 +4246,19 @@
           <p:cNvPr id="76" name="Elbow Connector 75"/>
           <p:cNvCxnSpPr>
             <a:stCxn id="69" idx="2"/>
-            <a:endCxn id="63" idx="1"/>
+            <a:endCxn id="63" idx="2"/>
           </p:cNvCxnSpPr>
           <p:nvPr/>
         </p:nvCxnSpPr>
         <p:spPr>
           <a:xfrm rot="16200000" flipH="1">
-            <a:off x="1569237" y="2973180"/>
-            <a:ext cx="220083" cy="1301156"/>
-          </a:xfrm>
-          <a:prstGeom prst="bentConnector2">
-            <a:avLst/>
+            <a:off x="1957393" y="2585024"/>
+            <a:ext cx="372483" cy="2229868"/>
+          </a:xfrm>
+          <a:prstGeom prst="bentConnector3">
+            <a:avLst>
+              <a:gd name="adj1" fmla="val 196758"/>
+            </a:avLst>
           </a:prstGeom>
           <a:solidFill>
             <a:srgbClr val="C0504D"/>
@@ -4312,7 +4282,7 @@
         </p:nvSpPr>
         <p:spPr>
           <a:xfrm>
-            <a:off x="5395440" y="975043"/>
+            <a:off x="4672657" y="975043"/>
             <a:ext cx="1843559" cy="304800"/>
           </a:xfrm>
           <a:prstGeom prst="rect">
@@ -4394,7 +4364,7 @@
         </p:nvSpPr>
         <p:spPr>
           <a:xfrm>
-            <a:off x="2121375" y="2845235"/>
+            <a:off x="2195252" y="2836760"/>
             <a:ext cx="646783" cy="369332"/>
           </a:xfrm>
           <a:prstGeom prst="rect">
@@ -4461,7 +4431,7 @@
         </p:nvSpPr>
         <p:spPr>
           <a:xfrm>
-            <a:off x="6553818" y="2117500"/>
+            <a:off x="5219925" y="1874147"/>
             <a:ext cx="1128128" cy="304800"/>
           </a:xfrm>
           <a:prstGeom prst="rect">
@@ -4543,7 +4513,7 @@
         </p:nvSpPr>
         <p:spPr>
           <a:xfrm>
-            <a:off x="6568072" y="2847687"/>
+            <a:off x="5234179" y="2604334"/>
             <a:ext cx="1128128" cy="304800"/>
           </a:xfrm>
           <a:prstGeom prst="rect">
@@ -4617,91 +4587,22 @@
           </a:p>
         </p:txBody>
       </p:sp>
-      <p:sp>
-        <p:nvSpPr>
-          <p:cNvPr id="81" name="Diamond 80"/>
-          <p:cNvSpPr/>
-          <p:nvPr/>
-        </p:nvSpPr>
-        <p:spPr>
-          <a:xfrm>
-            <a:off x="5871712" y="2455833"/>
-            <a:ext cx="244640" cy="244640"/>
-          </a:xfrm>
-          <a:prstGeom prst="diamond">
-            <a:avLst/>
-          </a:prstGeom>
-          <a:solidFill>
-            <a:srgbClr val="F79646">
-              <a:lumMod val="50000"/>
-            </a:srgbClr>
-          </a:solidFill>
-          <a:ln w="25400" cap="flat" cmpd="sng" algn="ctr">
-            <a:solidFill>
-              <a:srgbClr val="F79646">
-                <a:shade val="50000"/>
-              </a:srgbClr>
-            </a:solidFill>
-            <a:prstDash val="solid"/>
-          </a:ln>
-          <a:effectLst/>
-        </p:spPr>
-        <p:txBody>
-          <a:bodyPr rtlCol="0" anchor="ctr"/>
-          <a:lstStyle/>
-          <a:p>
-            <a:pPr marL="0" marR="0" lvl="0" indent="0" algn="ctr" defTabSz="914400" eaLnBrk="1" fontAlgn="auto" latinLnBrk="0" hangingPunct="1">
-              <a:lnSpc>
-                <a:spcPct val="100000"/>
-              </a:lnSpc>
-              <a:spcBef>
-                <a:spcPts val="0"/>
-              </a:spcBef>
-              <a:spcAft>
-                <a:spcPts val="0"/>
-              </a:spcAft>
-              <a:buClrTx/>
-              <a:buSzTx/>
-              <a:buFontTx/>
-              <a:buNone/>
-              <a:tabLst/>
-              <a:defRPr/>
-            </a:pPr>
-            <a:endParaRPr kumimoji="0" lang="en-US" sz="1800" b="1" i="0" u="none" strike="noStrike" kern="0" cap="none" spc="0" normalizeH="0" baseline="0" noProof="0" smtClean="0">
-              <a:ln>
-                <a:noFill/>
-              </a:ln>
-              <a:solidFill>
-                <a:prstClr val="white"/>
-              </a:solidFill>
-              <a:effectLst/>
-              <a:uLnTx/>
-              <a:uFillTx/>
-              <a:latin typeface="Calibri"/>
-              <a:ea typeface="+mn-ea"/>
-              <a:cs typeface="+mn-cs"/>
-            </a:endParaRPr>
-          </a:p>
-        </p:txBody>
-      </p:sp>
       <p:cxnSp>
         <p:nvCxnSpPr>
           <p:cNvPr id="82" name="Elbow Connector 81"/>
           <p:cNvCxnSpPr>
             <a:stCxn id="80" idx="1"/>
-            <a:endCxn id="81" idx="3"/>
+            <a:endCxn id="64" idx="2"/>
           </p:cNvCxnSpPr>
           <p:nvPr/>
         </p:nvCxnSpPr>
         <p:spPr>
           <a:xfrm rot="10800000">
-            <a:off x="6116352" y="2578153"/>
-            <a:ext cx="451720" cy="421934"/>
-          </a:xfrm>
-          <a:prstGeom prst="bentConnector3">
-            <a:avLst>
-              <a:gd name="adj1" fmla="val 50000"/>
-            </a:avLst>
+            <a:off x="4489821" y="2483748"/>
+            <a:ext cx="744358" cy="272987"/>
+          </a:xfrm>
+          <a:prstGeom prst="bentConnector2">
+            <a:avLst/>
           </a:prstGeom>
           <a:solidFill>
             <a:srgbClr val="F79646"/>
@@ -4725,7 +4626,7 @@
         </p:nvSpPr>
         <p:spPr>
           <a:xfrm>
-            <a:off x="6231348" y="1899771"/>
+            <a:off x="4994029" y="1965202"/>
             <a:ext cx="334177" cy="369332"/>
           </a:xfrm>
           <a:prstGeom prst="rect">
@@ -4801,34 +4702,27 @@
       </p:sp>
       <p:sp>
         <p:nvSpPr>
-          <p:cNvPr id="84" name="Diamond 83"/>
-          <p:cNvSpPr/>
+          <p:cNvPr id="86" name="TextBox 85"/>
+          <p:cNvSpPr txBox="1"/>
           <p:nvPr/>
         </p:nvSpPr>
         <p:spPr>
           <a:xfrm>
-            <a:off x="906338" y="2461612"/>
-            <a:ext cx="244640" cy="244640"/>
-          </a:xfrm>
-          <a:prstGeom prst="diamond">
+            <a:off x="3206888" y="3845011"/>
+            <a:ext cx="1221904" cy="369332"/>
+          </a:xfrm>
+          <a:prstGeom prst="rect">
             <a:avLst/>
           </a:prstGeom>
-          <a:solidFill>
-            <a:srgbClr val="002060"/>
-          </a:solidFill>
-          <a:ln w="25400" cap="flat" cmpd="sng" algn="ctr">
-            <a:solidFill>
-              <a:srgbClr val="002060"/>
-            </a:solidFill>
-            <a:prstDash val="solid"/>
-          </a:ln>
-          <a:effectLst/>
+          <a:noFill/>
         </p:spPr>
         <p:txBody>
-          <a:bodyPr rtlCol="0" anchor="ctr"/>
-          <a:lstStyle/>
-          <a:p>
-            <a:pPr marL="0" marR="0" lvl="0" indent="0" algn="ctr" defTabSz="914400" eaLnBrk="1" fontAlgn="auto" latinLnBrk="0" hangingPunct="1">
+          <a:bodyPr wrap="square" rtlCol="0">
+            <a:spAutoFit/>
+          </a:bodyPr>
+          <a:lstStyle/>
+          <a:p>
+            <a:pPr marL="0" marR="0" lvl="0" indent="0" algn="r" defTabSz="914400" eaLnBrk="1" fontAlgn="auto" latinLnBrk="0" hangingPunct="1">
               <a:lnSpc>
                 <a:spcPct val="100000"/>
               </a:lnSpc>
@@ -4845,91 +4739,8 @@
               <a:tabLst/>
               <a:defRPr/>
             </a:pPr>
-            <a:endParaRPr kumimoji="0" lang="en-US" sz="1800" b="1" i="0" u="none" strike="noStrike" kern="0" cap="none" spc="0" normalizeH="0" baseline="0" noProof="0" smtClean="0">
-              <a:ln>
-                <a:noFill/>
-              </a:ln>
-              <a:solidFill>
-                <a:prstClr val="white"/>
-              </a:solidFill>
-              <a:effectLst/>
-              <a:uLnTx/>
-              <a:uFillTx/>
-              <a:latin typeface="Calibri"/>
-              <a:ea typeface="+mn-ea"/>
-              <a:cs typeface="+mn-cs"/>
-            </a:endParaRPr>
-          </a:p>
-        </p:txBody>
-      </p:sp>
-      <p:grpSp>
-        <p:nvGrpSpPr>
-          <p:cNvPr id="85" name="Group 84"/>
-          <p:cNvGrpSpPr/>
-          <p:nvPr/>
-        </p:nvGrpSpPr>
-        <p:grpSpPr>
-          <a:xfrm>
-            <a:off x="685800" y="3733800"/>
-            <a:ext cx="1162051" cy="369332"/>
-            <a:chOff x="685800" y="3733800"/>
-            <a:chExt cx="1162051" cy="369332"/>
-          </a:xfrm>
-        </p:grpSpPr>
-        <p:sp>
-          <p:nvSpPr>
-            <p:cNvPr id="86" name="TextBox 85"/>
-            <p:cNvSpPr txBox="1"/>
-            <p:nvPr/>
-          </p:nvSpPr>
-          <p:spPr>
-            <a:xfrm>
-              <a:off x="685800" y="3733800"/>
-              <a:ext cx="1123950" cy="369332"/>
-            </a:xfrm>
-            <a:prstGeom prst="rect">
-              <a:avLst/>
-            </a:prstGeom>
-            <a:noFill/>
-          </p:spPr>
-          <p:txBody>
-            <a:bodyPr wrap="square" rtlCol="0">
-              <a:spAutoFit/>
-            </a:bodyPr>
-            <a:lstStyle/>
-            <a:p>
-              <a:pPr marL="0" marR="0" lvl="0" indent="0" algn="r" defTabSz="914400" eaLnBrk="1" fontAlgn="auto" latinLnBrk="0" hangingPunct="1">
-                <a:lnSpc>
-                  <a:spcPct val="100000"/>
-                </a:lnSpc>
-                <a:spcBef>
-                  <a:spcPts val="0"/>
-                </a:spcBef>
-                <a:spcAft>
-                  <a:spcPts val="0"/>
-                </a:spcAft>
-                <a:buClrTx/>
-                <a:buSzTx/>
-                <a:buFontTx/>
-                <a:buNone/>
-                <a:tabLst/>
-                <a:defRPr/>
-              </a:pPr>
-              <a:r>
-                <a:rPr kumimoji="0" lang="en-US" sz="1800" b="0" i="0" u="none" strike="noStrike" kern="0" cap="none" spc="0" normalizeH="0" baseline="0" noProof="0" dirty="0" smtClean="0">
-                  <a:ln>
-                    <a:noFill/>
-                  </a:ln>
-                  <a:solidFill>
-                    <a:srgbClr val="C0504D"/>
-                  </a:solidFill>
-                  <a:effectLst/>
-                  <a:uLnTx/>
-                  <a:uFillTx/>
-                </a:rPr>
-                <a:t>taught by</a:t>
-              </a:r>
-              <a:endParaRPr kumimoji="0" lang="en-SG" sz="1800" b="0" i="0" u="none" strike="noStrike" kern="0" cap="none" spc="0" normalizeH="0" baseline="0" noProof="0" dirty="0" smtClean="0">
+            <a:r>
+              <a:rPr kumimoji="0" lang="en-US" sz="1800" b="0" i="0" u="none" strike="noStrike" kern="0" cap="none" spc="0" normalizeH="0" baseline="0" noProof="0" dirty="0" smtClean="0">
                 <a:ln>
                   <a:noFill/>
                 </a:ln>
@@ -4939,74 +4750,23 @@
                 <a:effectLst/>
                 <a:uLnTx/>
                 <a:uFillTx/>
-              </a:endParaRPr>
-            </a:p>
-          </p:txBody>
-        </p:sp>
-        <p:sp>
-          <p:nvSpPr>
-            <p:cNvPr id="87" name="Isosceles Triangle 86"/>
-            <p:cNvSpPr/>
-            <p:nvPr/>
-          </p:nvSpPr>
-          <p:spPr>
-            <a:xfrm rot="5400000">
-              <a:off x="1748591" y="3903201"/>
-              <a:ext cx="122320" cy="76200"/>
-            </a:xfrm>
-            <a:prstGeom prst="triangle">
-              <a:avLst/>
-            </a:prstGeom>
-            <a:solidFill>
-              <a:srgbClr val="C0504D">
-                <a:lumMod val="75000"/>
-              </a:srgbClr>
-            </a:solidFill>
-            <a:ln w="25400" cap="flat" cmpd="sng" algn="ctr">
-              <a:noFill/>
-              <a:prstDash val="solid"/>
-            </a:ln>
-            <a:effectLst/>
-          </p:spPr>
-          <p:txBody>
-            <a:bodyPr rtlCol="0" anchor="ctr"/>
-            <a:lstStyle/>
-            <a:p>
-              <a:pPr marL="0" marR="0" lvl="0" indent="0" algn="ctr" defTabSz="914400" eaLnBrk="1" fontAlgn="auto" latinLnBrk="0" hangingPunct="1">
-                <a:lnSpc>
-                  <a:spcPct val="100000"/>
-                </a:lnSpc>
-                <a:spcBef>
-                  <a:spcPts val="0"/>
-                </a:spcBef>
-                <a:spcAft>
-                  <a:spcPts val="0"/>
-                </a:spcAft>
-                <a:buClrTx/>
-                <a:buSzTx/>
-                <a:buFontTx/>
-                <a:buNone/>
-                <a:tabLst/>
-                <a:defRPr/>
-              </a:pPr>
-              <a:endParaRPr kumimoji="0" lang="en-US" sz="1800" b="0" i="0" u="none" strike="noStrike" kern="0" cap="none" spc="0" normalizeH="0" baseline="0" noProof="0" smtClean="0">
-                <a:ln>
-                  <a:noFill/>
-                </a:ln>
-                <a:solidFill>
-                  <a:prstClr val="white"/>
-                </a:solidFill>
-                <a:effectLst/>
-                <a:uLnTx/>
-                <a:uFillTx/>
-                <a:latin typeface="Calibri"/>
-                <a:ea typeface="+mn-ea"/>
-                <a:cs typeface="+mn-cs"/>
-              </a:endParaRPr>
-            </a:p>
-          </p:txBody>
-        </p:sp>
-      </p:grpSp>
+              </a:rPr>
+              <a:t>instructors</a:t>
+            </a:r>
+            <a:endParaRPr kumimoji="0" lang="en-SG" sz="1800" b="0" i="0" u="none" strike="noStrike" kern="0" cap="none" spc="0" normalizeH="0" baseline="0" noProof="0" dirty="0" smtClean="0">
+              <a:ln>
+                <a:noFill/>
+              </a:ln>
+              <a:solidFill>
+                <a:srgbClr val="C0504D"/>
+              </a:solidFill>
+              <a:effectLst/>
+              <a:uLnTx/>
+              <a:uFillTx/>
+            </a:endParaRPr>
+          </a:p>
+        </p:txBody>
+      </p:sp>
       <p:grpSp>
         <p:nvGrpSpPr>
           <p:cNvPr id="88" name="Group 87"/>
@@ -5015,7 +4775,7 @@
         </p:nvGrpSpPr>
         <p:grpSpPr>
           <a:xfrm>
-            <a:off x="1515912" y="2466479"/>
+            <a:off x="1394694" y="2493263"/>
             <a:ext cx="1162051" cy="369332"/>
             <a:chOff x="685800" y="3733800"/>
             <a:chExt cx="1162051" cy="369332"/>
@@ -5154,14 +4914,15 @@
         <p:nvCxnSpPr>
           <p:cNvPr id="91" name="Elbow Connector 90"/>
           <p:cNvCxnSpPr>
-            <a:endCxn id="64" idx="0"/>
+            <a:stCxn id="59" idx="2"/>
+            <a:endCxn id="62" idx="0"/>
           </p:cNvCxnSpPr>
           <p:nvPr/>
         </p:nvCxnSpPr>
         <p:spPr>
           <a:xfrm rot="16200000" flipH="1">
-            <a:off x="4355479" y="1588124"/>
-            <a:ext cx="898299" cy="770052"/>
+            <a:off x="2745247" y="2124583"/>
+            <a:ext cx="1206719" cy="5552"/>
           </a:xfrm>
           <a:prstGeom prst="bentConnector3">
             <a:avLst>
@@ -5184,22 +4945,19 @@
       </p:cxnSp>
       <p:cxnSp>
         <p:nvCxnSpPr>
-          <p:cNvPr id="92" name="Elbow Connector 91"/>
+          <p:cNvPr id="15" name="Straight Connector 14"/>
           <p:cNvCxnSpPr>
-            <a:stCxn id="62" idx="2"/>
-            <a:endCxn id="64" idx="2"/>
+            <a:stCxn id="64" idx="1"/>
           </p:cNvCxnSpPr>
           <p:nvPr/>
         </p:nvCxnSpPr>
         <p:spPr>
-          <a:xfrm rot="5400000" flipH="1" flipV="1">
-            <a:off x="4116308" y="1962174"/>
-            <a:ext cx="308419" cy="1838272"/>
-          </a:xfrm>
-          <a:prstGeom prst="bentConnector3">
-            <a:avLst>
-              <a:gd name="adj1" fmla="val -74120"/>
-            </a:avLst>
+          <a:xfrm flipH="1">
+            <a:off x="3356933" y="2331347"/>
+            <a:ext cx="628680" cy="0"/>
+          </a:xfrm>
+          <a:prstGeom prst="line">
+            <a:avLst/>
           </a:prstGeom>
           <a:solidFill>
             <a:srgbClr val="9BBB59"/>
@@ -5210,6 +4968,37 @@
                 <a:lumMod val="50000"/>
               </a:srgbClr>
             </a:solidFill>
+            <a:prstDash val="sysDash"/>
+          </a:ln>
+          <a:effectLst/>
+        </p:spPr>
+      </p:cxnSp>
+      <p:cxnSp>
+        <p:nvCxnSpPr>
+          <p:cNvPr id="95" name="Elbow Connector 94"/>
+          <p:cNvCxnSpPr>
+            <a:stCxn id="69" idx="3"/>
+            <a:endCxn id="63" idx="0"/>
+          </p:cNvCxnSpPr>
+          <p:nvPr/>
+        </p:nvCxnSpPr>
+        <p:spPr>
+          <a:xfrm>
+            <a:off x="1524000" y="3267572"/>
+            <a:ext cx="1734568" cy="313828"/>
+          </a:xfrm>
+          <a:prstGeom prst="bentConnector2">
+            <a:avLst/>
+          </a:prstGeom>
+          <a:solidFill>
+            <a:srgbClr val="C0504D"/>
+          </a:solidFill>
+          <a:ln w="25400" cap="flat" cmpd="sng" algn="ctr">
+            <a:solidFill>
+              <a:srgbClr val="C0504D">
+                <a:shade val="50000"/>
+              </a:srgbClr>
+            </a:solidFill>
             <a:prstDash val="solid"/>
           </a:ln>
           <a:effectLst/>
@@ -5217,32 +5006,36 @@
       </p:cxnSp>
       <p:sp>
         <p:nvSpPr>
-          <p:cNvPr id="93" name="Folded Corner 92"/>
-          <p:cNvSpPr/>
+          <p:cNvPr id="96" name="TextBox 95"/>
+          <p:cNvSpPr txBox="1"/>
           <p:nvPr/>
         </p:nvSpPr>
         <p:spPr>
           <a:xfrm>
-            <a:off x="4516468" y="3549201"/>
-            <a:ext cx="2570132" cy="553932"/>
-          </a:xfrm>
-          <a:prstGeom prst="foldedCorner">
+            <a:off x="2924541" y="3273548"/>
+            <a:ext cx="536164" cy="369332"/>
+          </a:xfrm>
+          <a:prstGeom prst="rect">
             <a:avLst/>
           </a:prstGeom>
           <a:noFill/>
-          <a:ln w="25400" cap="flat" cmpd="sng" algn="ctr">
-            <a:solidFill>
-              <a:sysClr val="window" lastClr="FFFFFF">
-                <a:lumMod val="65000"/>
-              </a:sysClr>
-            </a:solidFill>
-            <a:prstDash val="solid"/>
-          </a:ln>
-          <a:effectLst/>
         </p:spPr>
         <p:txBody>
-          <a:bodyPr rtlCol="0" anchor="ctr"/>
-          <a:lstStyle/>
+          <a:bodyPr wrap="square" rtlCol="0">
+            <a:spAutoFit/>
+          </a:bodyPr>
+          <a:lstStyle>
+            <a:defPPr>
+              <a:defRPr lang="en-US"/>
+            </a:defPPr>
+            <a:lvl1pPr>
+              <a:defRPr>
+                <a:solidFill>
+                  <a:schemeClr val="tx2"/>
+                </a:solidFill>
+              </a:defRPr>
+            </a:lvl1pPr>
+          </a:lstStyle>
           <a:p>
             <a:pPr marL="0" marR="0" lvl="0" indent="0" defTabSz="914400" eaLnBrk="1" fontAlgn="auto" latinLnBrk="0" hangingPunct="1">
               <a:lnSpc>
@@ -5262,14 +5055,515 @@
               <a:defRPr/>
             </a:pPr>
             <a:r>
-              <a:rPr kumimoji="0" lang="en-US" sz="1600" b="0" i="0" u="none" strike="noStrike" kern="0" cap="none" spc="0" normalizeH="0" baseline="0" noProof="0" dirty="0" smtClean="0">
+              <a:rPr kumimoji="0" lang="en-US" sz="1800" b="0" i="0" u="none" strike="noStrike" kern="0" cap="none" spc="0" normalizeH="0" baseline="0" noProof="0" dirty="0" smtClean="0">
                 <a:ln>
                   <a:noFill/>
                 </a:ln>
                 <a:solidFill>
-                  <a:prstClr val="white">
+                  <a:srgbClr val="F79646">
                     <a:lumMod val="50000"/>
-                  </a:prstClr>
+                  </a:srgbClr>
+                </a:solidFill>
+                <a:effectLst/>
+                <a:uLnTx/>
+                <a:uFillTx/>
+              </a:rPr>
+              <a:t>1</a:t>
+            </a:r>
+            <a:endParaRPr kumimoji="0" lang="en-SG" sz="1800" b="0" i="0" u="none" strike="noStrike" kern="0" cap="none" spc="0" normalizeH="0" baseline="0" noProof="0" dirty="0">
+              <a:ln>
+                <a:noFill/>
+              </a:ln>
+              <a:solidFill>
+                <a:srgbClr val="F79646">
+                  <a:lumMod val="50000"/>
+                </a:srgbClr>
+              </a:solidFill>
+              <a:effectLst/>
+              <a:uLnTx/>
+              <a:uFillTx/>
+            </a:endParaRPr>
+          </a:p>
+        </p:txBody>
+      </p:sp>
+      <p:sp>
+        <p:nvSpPr>
+          <p:cNvPr id="97" name="TextBox 96"/>
+          <p:cNvSpPr txBox="1"/>
+          <p:nvPr/>
+        </p:nvSpPr>
+        <p:spPr>
+          <a:xfrm>
+            <a:off x="3206888" y="3254426"/>
+            <a:ext cx="1335730" cy="369332"/>
+          </a:xfrm>
+          <a:prstGeom prst="rect">
+            <a:avLst/>
+          </a:prstGeom>
+          <a:noFill/>
+        </p:spPr>
+        <p:txBody>
+          <a:bodyPr wrap="square" rtlCol="0">
+            <a:spAutoFit/>
+          </a:bodyPr>
+          <a:lstStyle/>
+          <a:p>
+            <a:pPr marL="0" marR="0" lvl="0" indent="0" algn="r" defTabSz="914400" eaLnBrk="1" fontAlgn="auto" latinLnBrk="0" hangingPunct="1">
+              <a:lnSpc>
+                <a:spcPct val="100000"/>
+              </a:lnSpc>
+              <a:spcBef>
+                <a:spcPts val="0"/>
+              </a:spcBef>
+              <a:spcAft>
+                <a:spcPts val="0"/>
+              </a:spcAft>
+              <a:buClrTx/>
+              <a:buSzTx/>
+              <a:buFontTx/>
+              <a:buNone/>
+              <a:tabLst/>
+              <a:defRPr/>
+            </a:pPr>
+            <a:r>
+              <a:rPr kumimoji="0" lang="en-US" sz="1800" b="0" i="0" u="none" strike="noStrike" kern="0" cap="none" spc="0" normalizeH="0" baseline="0" noProof="0" dirty="0" smtClean="0">
+                <a:ln>
+                  <a:noFill/>
+                </a:ln>
+                <a:solidFill>
+                  <a:srgbClr val="C0504D"/>
+                </a:solidFill>
+                <a:effectLst/>
+                <a:uLnTx/>
+                <a:uFillTx/>
+              </a:rPr>
+              <a:t>coordinator</a:t>
+            </a:r>
+            <a:endParaRPr kumimoji="0" lang="en-SG" sz="1800" b="0" i="0" u="none" strike="noStrike" kern="0" cap="none" spc="0" normalizeH="0" baseline="0" noProof="0" dirty="0" smtClean="0">
+              <a:ln>
+                <a:noFill/>
+              </a:ln>
+              <a:solidFill>
+                <a:srgbClr val="C0504D"/>
+              </a:solidFill>
+              <a:effectLst/>
+              <a:uLnTx/>
+              <a:uFillTx/>
+            </a:endParaRPr>
+          </a:p>
+        </p:txBody>
+      </p:sp>
+    </p:spTree>
+    <p:extLst>
+      <p:ext uri="{BB962C8B-B14F-4D97-AF65-F5344CB8AC3E}">
+        <p14:creationId xmlns:p14="http://schemas.microsoft.com/office/powerpoint/2010/main" val="3533211046"/>
+      </p:ext>
+    </p:extLst>
+  </p:cSld>
+  <p:clrMapOvr>
+    <a:masterClrMapping/>
+  </p:clrMapOvr>
+</p:sld>
+</file>
+
+<file path=ppt/slides/slide2.xml><?xml version="1.0" encoding="utf-8"?>
+<p:sld xmlns:a="http://schemas.openxmlformats.org/drawingml/2006/main" xmlns:r="http://schemas.openxmlformats.org/officeDocument/2006/relationships" xmlns:p="http://schemas.openxmlformats.org/presentationml/2006/main">
+  <p:cSld>
+    <p:spTree>
+      <p:nvGrpSpPr>
+        <p:cNvPr id="1" name=""/>
+        <p:cNvGrpSpPr/>
+        <p:nvPr/>
+      </p:nvGrpSpPr>
+      <p:grpSpPr>
+        <a:xfrm>
+          <a:off x="0" y="0"/>
+          <a:ext cx="0" cy="0"/>
+          <a:chOff x="0" y="0"/>
+          <a:chExt cx="0" cy="0"/>
+        </a:xfrm>
+      </p:grpSpPr>
+      <p:sp>
+        <p:nvSpPr>
+          <p:cNvPr id="2" name="Rectangle 1"/>
+          <p:cNvSpPr/>
+          <p:nvPr/>
+        </p:nvSpPr>
+        <p:spPr>
+          <a:xfrm>
+            <a:off x="467544" y="908720"/>
+            <a:ext cx="6120680" cy="3672408"/>
+          </a:xfrm>
+          <a:prstGeom prst="rect">
+            <a:avLst/>
+          </a:prstGeom>
+          <a:solidFill>
+            <a:schemeClr val="bg1"/>
+          </a:solidFill>
+          <a:ln>
+            <a:solidFill>
+              <a:schemeClr val="bg1">
+                <a:lumMod val="85000"/>
+              </a:schemeClr>
+            </a:solidFill>
+          </a:ln>
+        </p:spPr>
+        <p:style>
+          <a:lnRef idx="2">
+            <a:schemeClr val="accent1">
+              <a:shade val="50000"/>
+            </a:schemeClr>
+          </a:lnRef>
+          <a:fillRef idx="1">
+            <a:schemeClr val="accent1"/>
+          </a:fillRef>
+          <a:effectRef idx="0">
+            <a:schemeClr val="accent1"/>
+          </a:effectRef>
+          <a:fontRef idx="minor">
+            <a:schemeClr val="lt1"/>
+          </a:fontRef>
+        </p:style>
+        <p:txBody>
+          <a:bodyPr rtlCol="0" anchor="ctr"/>
+          <a:lstStyle/>
+          <a:p>
+            <a:pPr algn="ctr"/>
+            <a:endParaRPr lang="en-US"/>
+          </a:p>
+        </p:txBody>
+      </p:sp>
+      <p:sp>
+        <p:nvSpPr>
+          <p:cNvPr id="58" name="Rectangle 57"/>
+          <p:cNvSpPr/>
+          <p:nvPr/>
+        </p:nvSpPr>
+        <p:spPr>
+          <a:xfrm>
+            <a:off x="537010" y="2614526"/>
+            <a:ext cx="986990" cy="304800"/>
+          </a:xfrm>
+          <a:prstGeom prst="rect">
+            <a:avLst/>
+          </a:prstGeom>
+          <a:noFill/>
+          <a:ln w="25400" cap="flat" cmpd="sng" algn="ctr">
+            <a:noFill/>
+            <a:prstDash val="solid"/>
+          </a:ln>
+          <a:effectLst/>
+        </p:spPr>
+        <p:txBody>
+          <a:bodyPr rtlCol="0" anchor="ctr"/>
+          <a:lstStyle/>
+          <a:p>
+            <a:pPr marL="0" marR="0" lvl="0" indent="0" algn="ctr" defTabSz="914400" eaLnBrk="1" fontAlgn="auto" latinLnBrk="0" hangingPunct="1">
+              <a:lnSpc>
+                <a:spcPct val="100000"/>
+              </a:lnSpc>
+              <a:spcBef>
+                <a:spcPts val="0"/>
+              </a:spcBef>
+              <a:spcAft>
+                <a:spcPts val="0"/>
+              </a:spcAft>
+              <a:buClrTx/>
+              <a:buSzTx/>
+              <a:buFontTx/>
+              <a:buNone/>
+              <a:tabLst/>
+              <a:defRPr/>
+            </a:pPr>
+            <a:r>
+              <a:rPr kumimoji="0" lang="en-US" sz="1800" i="0" u="none" strike="noStrike" kern="0" cap="none" spc="0" normalizeH="0" baseline="0" noProof="0" dirty="0" smtClean="0">
+                <a:ln>
+                  <a:noFill/>
+                </a:ln>
+                <a:effectLst/>
+                <a:uLnTx/>
+                <a:uFillTx/>
+                <a:latin typeface="Calibri"/>
+                <a:ea typeface="+mn-ea"/>
+                <a:cs typeface="+mn-cs"/>
+              </a:rPr>
+              <a:t>Course</a:t>
+            </a:r>
+            <a:endParaRPr kumimoji="0" lang="en-SG" sz="1800" i="0" u="none" strike="noStrike" kern="0" cap="none" spc="0" normalizeH="0" baseline="0" noProof="0" dirty="0" smtClean="0">
+              <a:ln>
+                <a:noFill/>
+              </a:ln>
+              <a:effectLst/>
+              <a:uLnTx/>
+              <a:uFillTx/>
+              <a:latin typeface="Calibri"/>
+              <a:ea typeface="+mn-ea"/>
+              <a:cs typeface="+mn-cs"/>
+            </a:endParaRPr>
+          </a:p>
+        </p:txBody>
+      </p:sp>
+      <p:sp>
+        <p:nvSpPr>
+          <p:cNvPr id="59" name="Rectangle 58"/>
+          <p:cNvSpPr/>
+          <p:nvPr/>
+        </p:nvSpPr>
+        <p:spPr>
+          <a:xfrm>
+            <a:off x="2750985" y="1246726"/>
+            <a:ext cx="1082548" cy="304800"/>
+          </a:xfrm>
+          <a:prstGeom prst="rect">
+            <a:avLst/>
+          </a:prstGeom>
+          <a:noFill/>
+          <a:ln w="25400" cap="flat" cmpd="sng" algn="ctr">
+            <a:noFill/>
+            <a:prstDash val="solid"/>
+          </a:ln>
+          <a:effectLst/>
+        </p:spPr>
+        <p:txBody>
+          <a:bodyPr rtlCol="0" anchor="ctr"/>
+          <a:lstStyle/>
+          <a:p>
+            <a:pPr marL="0" marR="0" lvl="0" indent="0" algn="ctr" defTabSz="914400" eaLnBrk="1" fontAlgn="auto" latinLnBrk="0" hangingPunct="1">
+              <a:lnSpc>
+                <a:spcPct val="100000"/>
+              </a:lnSpc>
+              <a:spcBef>
+                <a:spcPts val="0"/>
+              </a:spcBef>
+              <a:spcAft>
+                <a:spcPts val="0"/>
+              </a:spcAft>
+              <a:buClrTx/>
+              <a:buSzTx/>
+              <a:buFontTx/>
+              <a:buNone/>
+              <a:tabLst/>
+              <a:defRPr/>
+            </a:pPr>
+            <a:r>
+              <a:rPr kumimoji="0" lang="en-US" sz="1800" i="0" u="none" strike="noStrike" kern="0" cap="none" spc="0" normalizeH="0" baseline="0" noProof="0" dirty="0" smtClean="0">
+                <a:ln>
+                  <a:noFill/>
+                </a:ln>
+                <a:effectLst/>
+                <a:uLnTx/>
+                <a:uFillTx/>
+                <a:latin typeface="Calibri"/>
+                <a:ea typeface="+mn-ea"/>
+                <a:cs typeface="+mn-cs"/>
+              </a:rPr>
+              <a:t>Task</a:t>
+            </a:r>
+            <a:endParaRPr kumimoji="0" lang="en-SG" sz="1800" i="0" u="none" strike="noStrike" kern="0" cap="none" spc="0" normalizeH="0" baseline="0" noProof="0" dirty="0" smtClean="0">
+              <a:ln>
+                <a:noFill/>
+              </a:ln>
+              <a:effectLst/>
+              <a:uLnTx/>
+              <a:uFillTx/>
+              <a:latin typeface="Calibri"/>
+              <a:ea typeface="+mn-ea"/>
+              <a:cs typeface="+mn-cs"/>
+            </a:endParaRPr>
+          </a:p>
+        </p:txBody>
+      </p:sp>
+      <p:sp>
+        <p:nvSpPr>
+          <p:cNvPr id="62" name="Rectangle 61"/>
+          <p:cNvSpPr/>
+          <p:nvPr/>
+        </p:nvSpPr>
+        <p:spPr>
+          <a:xfrm>
+            <a:off x="2734365" y="2625895"/>
+            <a:ext cx="1071445" cy="304800"/>
+          </a:xfrm>
+          <a:prstGeom prst="rect">
+            <a:avLst/>
+          </a:prstGeom>
+          <a:noFill/>
+          <a:ln w="25400" cap="flat" cmpd="sng" algn="ctr">
+            <a:noFill/>
+            <a:prstDash val="solid"/>
+          </a:ln>
+          <a:effectLst/>
+        </p:spPr>
+        <p:txBody>
+          <a:bodyPr rtlCol="0" anchor="ctr"/>
+          <a:lstStyle/>
+          <a:p>
+            <a:pPr marL="0" marR="0" lvl="0" indent="0" algn="ctr" defTabSz="914400" eaLnBrk="1" fontAlgn="auto" latinLnBrk="0" hangingPunct="1">
+              <a:lnSpc>
+                <a:spcPct val="100000"/>
+              </a:lnSpc>
+              <a:spcBef>
+                <a:spcPts val="0"/>
+              </a:spcBef>
+              <a:spcAft>
+                <a:spcPts val="0"/>
+              </a:spcAft>
+              <a:buClrTx/>
+              <a:buSzTx/>
+              <a:buFontTx/>
+              <a:buNone/>
+              <a:tabLst/>
+              <a:defRPr/>
+            </a:pPr>
+            <a:r>
+              <a:rPr kumimoji="0" lang="en-US" sz="1800" i="0" u="none" strike="noStrike" kern="0" cap="none" spc="0" normalizeH="0" baseline="0" noProof="0" dirty="0" smtClean="0">
+                <a:ln>
+                  <a:noFill/>
+                </a:ln>
+                <a:effectLst/>
+                <a:uLnTx/>
+                <a:uFillTx/>
+                <a:latin typeface="Calibri"/>
+                <a:ea typeface="+mn-ea"/>
+                <a:cs typeface="+mn-cs"/>
+              </a:rPr>
+              <a:t>Student</a:t>
+            </a:r>
+            <a:endParaRPr kumimoji="0" lang="en-SG" sz="1800" i="0" u="none" strike="noStrike" kern="0" cap="none" spc="0" normalizeH="0" baseline="0" noProof="0" dirty="0" smtClean="0">
+              <a:ln>
+                <a:noFill/>
+              </a:ln>
+              <a:effectLst/>
+              <a:uLnTx/>
+              <a:uFillTx/>
+              <a:latin typeface="Calibri"/>
+              <a:ea typeface="+mn-ea"/>
+              <a:cs typeface="+mn-cs"/>
+            </a:endParaRPr>
+          </a:p>
+        </p:txBody>
+      </p:sp>
+      <p:sp>
+        <p:nvSpPr>
+          <p:cNvPr id="63" name="Rectangle 62"/>
+          <p:cNvSpPr/>
+          <p:nvPr/>
+        </p:nvSpPr>
+        <p:spPr>
+          <a:xfrm>
+            <a:off x="2653072" y="4005064"/>
+            <a:ext cx="1234032" cy="304800"/>
+          </a:xfrm>
+          <a:prstGeom prst="rect">
+            <a:avLst/>
+          </a:prstGeom>
+          <a:noFill/>
+          <a:ln w="25400" cap="flat" cmpd="sng" algn="ctr">
+            <a:noFill/>
+            <a:prstDash val="solid"/>
+          </a:ln>
+          <a:effectLst/>
+        </p:spPr>
+        <p:txBody>
+          <a:bodyPr rtlCol="0" anchor="ctr"/>
+          <a:lstStyle/>
+          <a:p>
+            <a:pPr marL="0" marR="0" lvl="0" indent="0" algn="ctr" defTabSz="914400" eaLnBrk="1" fontAlgn="auto" latinLnBrk="0" hangingPunct="1">
+              <a:lnSpc>
+                <a:spcPct val="100000"/>
+              </a:lnSpc>
+              <a:spcBef>
+                <a:spcPts val="0"/>
+              </a:spcBef>
+              <a:spcAft>
+                <a:spcPts val="0"/>
+              </a:spcAft>
+              <a:buClrTx/>
+              <a:buSzTx/>
+              <a:buFontTx/>
+              <a:buNone/>
+              <a:tabLst/>
+              <a:defRPr/>
+            </a:pPr>
+            <a:r>
+              <a:rPr kumimoji="0" lang="en-US" sz="1800" i="0" u="none" strike="noStrike" kern="0" cap="none" spc="0" normalizeH="0" baseline="0" noProof="0" dirty="0" smtClean="0">
+                <a:ln>
+                  <a:noFill/>
+                </a:ln>
+                <a:effectLst/>
+                <a:uLnTx/>
+                <a:uFillTx/>
+                <a:latin typeface="Calibri"/>
+                <a:ea typeface="+mn-ea"/>
+                <a:cs typeface="+mn-cs"/>
+              </a:rPr>
+              <a:t>Instructor</a:t>
+            </a:r>
+            <a:endParaRPr kumimoji="0" lang="en-SG" sz="1800" i="0" u="none" strike="noStrike" kern="0" cap="none" spc="0" normalizeH="0" baseline="0" noProof="0" dirty="0" smtClean="0">
+              <a:ln>
+                <a:noFill/>
+              </a:ln>
+              <a:effectLst/>
+              <a:uLnTx/>
+              <a:uFillTx/>
+              <a:latin typeface="Calibri"/>
+              <a:ea typeface="+mn-ea"/>
+              <a:cs typeface="+mn-cs"/>
+            </a:endParaRPr>
+          </a:p>
+        </p:txBody>
+      </p:sp>
+      <p:sp>
+        <p:nvSpPr>
+          <p:cNvPr id="36" name="Rectangle 35"/>
+          <p:cNvSpPr/>
+          <p:nvPr/>
+        </p:nvSpPr>
+        <p:spPr>
+          <a:xfrm>
+            <a:off x="4860032" y="2592524"/>
+            <a:ext cx="1071445" cy="304800"/>
+          </a:xfrm>
+          <a:prstGeom prst="rect">
+            <a:avLst/>
+          </a:prstGeom>
+          <a:noFill/>
+          <a:ln w="25400" cap="flat" cmpd="sng" algn="ctr">
+            <a:noFill/>
+            <a:prstDash val="solid"/>
+          </a:ln>
+          <a:effectLst/>
+        </p:spPr>
+        <p:txBody>
+          <a:bodyPr rtlCol="0" anchor="ctr"/>
+          <a:lstStyle/>
+          <a:p>
+            <a:pPr marL="0" marR="0" lvl="0" indent="0" algn="ctr" defTabSz="914400" eaLnBrk="1" fontAlgn="auto" latinLnBrk="0" hangingPunct="1">
+              <a:lnSpc>
+                <a:spcPct val="100000"/>
+              </a:lnSpc>
+              <a:spcBef>
+                <a:spcPts val="0"/>
+              </a:spcBef>
+              <a:spcAft>
+                <a:spcPts val="0"/>
+              </a:spcAft>
+              <a:buClrTx/>
+              <a:buSzTx/>
+              <a:buFontTx/>
+              <a:buNone/>
+              <a:tabLst/>
+              <a:defRPr/>
+            </a:pPr>
+            <a:r>
+              <a:rPr kumimoji="0" lang="en-US" sz="1800" i="0" u="none" strike="noStrike" kern="0" cap="none" spc="0" normalizeH="0" baseline="0" noProof="0" dirty="0" smtClean="0">
+                <a:ln>
+                  <a:noFill/>
+                </a:ln>
+                <a:solidFill>
+                  <a:schemeClr val="bg1">
+                    <a:lumMod val="75000"/>
+                  </a:schemeClr>
                 </a:solidFill>
                 <a:effectLst/>
                 <a:uLnTx/>
@@ -5278,54 +5572,16 @@
                 <a:ea typeface="+mn-ea"/>
                 <a:cs typeface="+mn-cs"/>
               </a:rPr>
-              <a:t>Attempt can be shown as an </a:t>
-            </a:r>
-            <a:r>
-              <a:rPr kumimoji="0" lang="en-US" sz="1600" b="0" i="1" u="none" strike="noStrike" kern="0" cap="none" spc="0" normalizeH="0" baseline="0" noProof="0" dirty="0" smtClean="0">
-                <a:ln>
-                  <a:noFill/>
-                </a:ln>
-                <a:solidFill>
-                  <a:prstClr val="white">
-                    <a:lumMod val="50000"/>
-                  </a:prstClr>
-                </a:solidFill>
-                <a:effectLst/>
-                <a:uLnTx/>
-                <a:uFillTx/>
-                <a:latin typeface="Calibri"/>
-                <a:ea typeface="+mn-ea"/>
-                <a:cs typeface="+mn-cs"/>
-              </a:rPr>
-              <a:t>association class </a:t>
-            </a:r>
-            <a:r>
-              <a:rPr kumimoji="0" lang="en-US" sz="1600" b="0" i="0" u="none" strike="noStrike" kern="0" cap="none" spc="0" normalizeH="0" baseline="0" noProof="0" dirty="0" smtClean="0">
-                <a:ln>
-                  <a:noFill/>
-                </a:ln>
-                <a:solidFill>
-                  <a:prstClr val="white">
-                    <a:lumMod val="50000"/>
-                  </a:prstClr>
-                </a:solidFill>
-                <a:effectLst/>
-                <a:uLnTx/>
-                <a:uFillTx/>
-                <a:latin typeface="Calibri"/>
-                <a:ea typeface="+mn-ea"/>
-                <a:cs typeface="+mn-cs"/>
-              </a:rPr>
-              <a:t>too</a:t>
-            </a:r>
-            <a:endParaRPr kumimoji="0" lang="en-SG" sz="1600" b="0" i="0" u="none" strike="noStrike" kern="0" cap="none" spc="0" normalizeH="0" baseline="0" noProof="0" dirty="0" smtClean="0">
+              <a:t>More classes…</a:t>
+            </a:r>
+            <a:endParaRPr kumimoji="0" lang="en-SG" sz="1800" i="0" u="none" strike="noStrike" kern="0" cap="none" spc="0" normalizeH="0" baseline="0" noProof="0" dirty="0" smtClean="0">
               <a:ln>
                 <a:noFill/>
               </a:ln>
               <a:solidFill>
-                <a:prstClr val="white">
-                  <a:lumMod val="50000"/>
-                </a:prstClr>
+                <a:schemeClr val="bg1">
+                  <a:lumMod val="75000"/>
+                </a:schemeClr>
               </a:solidFill>
               <a:effectLst/>
               <a:uLnTx/>
@@ -5340,7 +5596,7 @@
     </p:spTree>
     <p:extLst>
       <p:ext uri="{BB962C8B-B14F-4D97-AF65-F5344CB8AC3E}">
-        <p14:creationId xmlns:p14="http://schemas.microsoft.com/office/powerpoint/2010/main" val="3533211046"/>
+        <p14:creationId xmlns:p14="http://schemas.microsoft.com/office/powerpoint/2010/main" val="4128526386"/>
       </p:ext>
     </p:extLst>
   </p:cSld>

</xml_diff>